<commit_message>
added user example information
</commit_message>
<xml_diff>
--- a/SetStats_lastRelease.pptx
+++ b/SetStats_lastRelease.pptx
@@ -767,7 +767,7 @@
             <a:fld id="{1E700B27-DE4C-4B9E-BB11-B9027034A00F}" type="datetimeFigureOut">
               <a:rPr lang="en-US" dirty="0"/>
               <a:pPr/>
-              <a:t>12/14/2021</a:t>
+              <a:t>12/15/2021</a:t>
             </a:fld>
             <a:endParaRPr lang="en-US" dirty="0"/>
           </a:p>
@@ -1883,7 +1883,7 @@
           <a:p>
             <a:fld id="{C40F4739-9812-4A9F-890D-2AD6BA5F6EE8}" type="datetimeFigureOut">
               <a:rPr lang="en-US" dirty="0"/>
-              <a:t>12/14/2021</a:t>
+              <a:t>12/15/2021</a:t>
             </a:fld>
             <a:endParaRPr lang="en-US" dirty="0"/>
           </a:p>
@@ -2890,7 +2890,7 @@
           <a:p>
             <a:fld id="{18845AC5-A3F8-44AA-BA8F-596CDCC976D3}" type="datetimeFigureOut">
               <a:rPr lang="en-US" dirty="0"/>
-              <a:t>12/14/2021</a:t>
+              <a:t>12/15/2021</a:t>
             </a:fld>
             <a:endParaRPr lang="en-US" dirty="0"/>
           </a:p>
@@ -4056,7 +4056,7 @@
           <a:p>
             <a:fld id="{C873B183-A821-4095-A363-9EC968635539}" type="datetimeFigureOut">
               <a:rPr lang="en-US" dirty="0"/>
-              <a:t>12/14/2021</a:t>
+              <a:t>12/15/2021</a:t>
             </a:fld>
             <a:endParaRPr lang="en-US" dirty="0"/>
           </a:p>
@@ -5113,7 +5113,7 @@
           <a:p>
             <a:fld id="{174D01B4-0AA5-45E6-B2E6-5FA4078AEBCF}" type="datetimeFigureOut">
               <a:rPr lang="en-US" dirty="0"/>
-              <a:t>12/14/2021</a:t>
+              <a:t>12/15/2021</a:t>
             </a:fld>
             <a:endParaRPr lang="en-US" dirty="0"/>
           </a:p>
@@ -5755,7 +5755,7 @@
           <a:p>
             <a:fld id="{4147335C-0450-40D7-8612-B3203BED4F28}" type="datetimeFigureOut">
               <a:rPr lang="en-US" dirty="0"/>
-              <a:t>12/14/2021</a:t>
+              <a:t>12/15/2021</a:t>
             </a:fld>
             <a:endParaRPr lang="en-US" dirty="0"/>
           </a:p>
@@ -6598,7 +6598,7 @@
           <a:p>
             <a:fld id="{D246A105-2A1C-4284-B4EA-07CF89B1A393}" type="datetimeFigureOut">
               <a:rPr lang="en-US" dirty="0"/>
-              <a:t>12/14/2021</a:t>
+              <a:t>12/15/2021</a:t>
             </a:fld>
             <a:endParaRPr lang="en-US" dirty="0"/>
           </a:p>
@@ -6769,7 +6769,7 @@
           <a:p>
             <a:fld id="{80DBE609-F3F2-45E6-BD6A-E03A8C86C1AE}" type="datetimeFigureOut">
               <a:rPr lang="en-US" dirty="0"/>
-              <a:t>12/14/2021</a:t>
+              <a:t>12/15/2021</a:t>
             </a:fld>
             <a:endParaRPr lang="en-US" dirty="0"/>
           </a:p>
@@ -7763,7 +7763,7 @@
           <a:p>
             <a:fld id="{7A24AD68-089C-4467-A8F3-EA2BBCA6B44E}" type="datetimeFigureOut">
               <a:rPr lang="en-US" dirty="0"/>
-              <a:t>12/14/2021</a:t>
+              <a:t>12/15/2021</a:t>
             </a:fld>
             <a:endParaRPr lang="en-US" dirty="0"/>
           </a:p>
@@ -7965,7 +7965,7 @@
           <a:p>
             <a:fld id="{75C51FCE-E4BB-4680-8E50-3C0E348D2609}" type="datetimeFigureOut">
               <a:rPr lang="en-US" dirty="0"/>
-              <a:t>12/14/2021</a:t>
+              <a:t>12/15/2021</a:t>
             </a:fld>
             <a:endParaRPr lang="en-US" dirty="0"/>
           </a:p>
@@ -9023,7 +9023,7 @@
           <a:p>
             <a:fld id="{8AAA073D-A903-47F8-8D16-77642FB0DF1F}" type="datetimeFigureOut">
               <a:rPr lang="en-US" dirty="0"/>
-              <a:t>12/14/2021</a:t>
+              <a:t>12/15/2021</a:t>
             </a:fld>
             <a:endParaRPr lang="en-US" dirty="0"/>
           </a:p>
@@ -9291,7 +9291,7 @@
           <a:p>
             <a:fld id="{AB91FA40-626B-4CA1-85D0-7A9016E395BA}" type="datetimeFigureOut">
               <a:rPr lang="en-US" dirty="0"/>
-              <a:t>12/14/2021</a:t>
+              <a:t>12/15/2021</a:t>
             </a:fld>
             <a:endParaRPr lang="en-US" dirty="0"/>
           </a:p>
@@ -9669,7 +9669,7 @@
           <a:p>
             <a:fld id="{C3F425EA-B9DC-48A7-991E-9A82573B1B21}" type="datetimeFigureOut">
               <a:rPr lang="en-US" dirty="0"/>
-              <a:t>12/14/2021</a:t>
+              <a:t>12/15/2021</a:t>
             </a:fld>
             <a:endParaRPr lang="en-US" dirty="0"/>
           </a:p>
@@ -9783,7 +9783,7 @@
           <a:p>
             <a:fld id="{66CB97F8-6CEB-469B-AFCC-889F2A2B1D5A}" type="datetimeFigureOut">
               <a:rPr lang="en-US" dirty="0"/>
-              <a:t>12/14/2021</a:t>
+              <a:t>12/15/2021</a:t>
             </a:fld>
             <a:endParaRPr lang="en-US" dirty="0"/>
           </a:p>
@@ -9874,7 +9874,7 @@
           <a:p>
             <a:fld id="{8FA9179F-009E-4FA5-B091-7EBB82A185BD}" type="datetimeFigureOut">
               <a:rPr lang="en-US" dirty="0"/>
-              <a:t>12/14/2021</a:t>
+              <a:t>12/15/2021</a:t>
             </a:fld>
             <a:endParaRPr lang="en-US" dirty="0"/>
           </a:p>
@@ -10979,7 +10979,7 @@
           <a:p>
             <a:fld id="{8E665CEB-0076-4E37-B880-BCEA9784DE0A}" type="datetimeFigureOut">
               <a:rPr lang="en-US" dirty="0"/>
-              <a:t>12/14/2021</a:t>
+              <a:t>12/15/2021</a:t>
             </a:fld>
             <a:endParaRPr lang="en-US" dirty="0"/>
           </a:p>
@@ -12108,7 +12108,7 @@
           <a:p>
             <a:fld id="{A6149E5E-3896-4118-99A7-7B85668F1C5E}" type="datetimeFigureOut">
               <a:rPr lang="en-US" dirty="0"/>
-              <a:t>12/14/2021</a:t>
+              <a:t>12/15/2021</a:t>
             </a:fld>
             <a:endParaRPr lang="en-US" dirty="0"/>
           </a:p>
@@ -13132,7 +13132,7 @@
           <a:p>
             <a:fld id="{7E0D914D-B099-4142-A885-11F276715148}" type="datetimeFigureOut">
               <a:rPr lang="en-US" dirty="0"/>
-              <a:t>12/14/2021</a:t>
+              <a:t>12/15/2021</a:t>
             </a:fld>
             <a:endParaRPr lang="en-US" dirty="0"/>
           </a:p>
@@ -16035,8 +16035,47 @@
           <a:p>
             <a:r>
               <a:rPr lang="en-IE" dirty="0"/>
-              <a:t>In depth of one specific user (most likely beginner or average)</a:t>
+              <a:t>Likes to train after work, usually 2 – 3 times a week</a:t>
             </a:r>
+          </a:p>
+          <a:p>
+            <a:r>
+              <a:rPr lang="en-IE" dirty="0"/>
+              <a:t>Trains to stay healthy and get the head free from the daily stress</a:t>
+            </a:r>
+          </a:p>
+          <a:p>
+            <a:endParaRPr lang="en-IE" dirty="0"/>
+          </a:p>
+          <a:p>
+            <a:r>
+              <a:rPr lang="en-IE" dirty="0"/>
+              <a:t>Likes a quiet environment and wants to train on his own</a:t>
+            </a:r>
+          </a:p>
+          <a:p>
+            <a:r>
+              <a:rPr lang="en-IE" dirty="0"/>
+              <a:t>Has good knowledge about Smartphones/Apps and the usage of them</a:t>
+            </a:r>
+          </a:p>
+          <a:p>
+            <a:endParaRPr lang="en-IE" dirty="0"/>
+          </a:p>
+          <a:p>
+            <a:r>
+              <a:rPr lang="en-IE" dirty="0"/>
+              <a:t>Expects the app to help him improve his form and give feedback</a:t>
+            </a:r>
+          </a:p>
+          <a:p>
+            <a:r>
+              <a:rPr lang="en-IE" dirty="0"/>
+              <a:t>Kind of new to deadlifting and therefor needs more advice</a:t>
+            </a:r>
+          </a:p>
+          <a:p>
+            <a:endParaRPr lang="en-IE" dirty="0"/>
           </a:p>
         </p:txBody>
       </p:sp>
@@ -16178,10 +16217,7 @@
             </a:r>
           </a:p>
           <a:p>
-            <a:r>
-              <a:rPr lang="en-IE" b="1" dirty="0"/>
-              <a:t>etc</a:t>
-            </a:r>
+            <a:endParaRPr lang="en-IE" b="1" dirty="0"/>
           </a:p>
           <a:p>
             <a:endParaRPr lang="en-IE" dirty="0"/>

</xml_diff>

<commit_message>
corrected spelling mistake and removed placeholders
</commit_message>
<xml_diff>
--- a/SetStats_lastRelease.pptx
+++ b/SetStats_lastRelease.pptx
@@ -767,7 +767,7 @@
             <a:fld id="{1E700B27-DE4C-4B9E-BB11-B9027034A00F}" type="datetimeFigureOut">
               <a:rPr lang="en-US" dirty="0"/>
               <a:pPr/>
-              <a:t>12/15/2021</a:t>
+              <a:t>12/16/2021</a:t>
             </a:fld>
             <a:endParaRPr lang="en-US" dirty="0"/>
           </a:p>
@@ -1883,7 +1883,7 @@
           <a:p>
             <a:fld id="{C40F4739-9812-4A9F-890D-2AD6BA5F6EE8}" type="datetimeFigureOut">
               <a:rPr lang="en-US" dirty="0"/>
-              <a:t>12/15/2021</a:t>
+              <a:t>12/16/2021</a:t>
             </a:fld>
             <a:endParaRPr lang="en-US" dirty="0"/>
           </a:p>
@@ -2890,7 +2890,7 @@
           <a:p>
             <a:fld id="{18845AC5-A3F8-44AA-BA8F-596CDCC976D3}" type="datetimeFigureOut">
               <a:rPr lang="en-US" dirty="0"/>
-              <a:t>12/15/2021</a:t>
+              <a:t>12/16/2021</a:t>
             </a:fld>
             <a:endParaRPr lang="en-US" dirty="0"/>
           </a:p>
@@ -4056,7 +4056,7 @@
           <a:p>
             <a:fld id="{C873B183-A821-4095-A363-9EC968635539}" type="datetimeFigureOut">
               <a:rPr lang="en-US" dirty="0"/>
-              <a:t>12/15/2021</a:t>
+              <a:t>12/16/2021</a:t>
             </a:fld>
             <a:endParaRPr lang="en-US" dirty="0"/>
           </a:p>
@@ -5113,7 +5113,7 @@
           <a:p>
             <a:fld id="{174D01B4-0AA5-45E6-B2E6-5FA4078AEBCF}" type="datetimeFigureOut">
               <a:rPr lang="en-US" dirty="0"/>
-              <a:t>12/15/2021</a:t>
+              <a:t>12/16/2021</a:t>
             </a:fld>
             <a:endParaRPr lang="en-US" dirty="0"/>
           </a:p>
@@ -5755,7 +5755,7 @@
           <a:p>
             <a:fld id="{4147335C-0450-40D7-8612-B3203BED4F28}" type="datetimeFigureOut">
               <a:rPr lang="en-US" dirty="0"/>
-              <a:t>12/15/2021</a:t>
+              <a:t>12/16/2021</a:t>
             </a:fld>
             <a:endParaRPr lang="en-US" dirty="0"/>
           </a:p>
@@ -6598,7 +6598,7 @@
           <a:p>
             <a:fld id="{D246A105-2A1C-4284-B4EA-07CF89B1A393}" type="datetimeFigureOut">
               <a:rPr lang="en-US" dirty="0"/>
-              <a:t>12/15/2021</a:t>
+              <a:t>12/16/2021</a:t>
             </a:fld>
             <a:endParaRPr lang="en-US" dirty="0"/>
           </a:p>
@@ -6769,7 +6769,7 @@
           <a:p>
             <a:fld id="{80DBE609-F3F2-45E6-BD6A-E03A8C86C1AE}" type="datetimeFigureOut">
               <a:rPr lang="en-US" dirty="0"/>
-              <a:t>12/15/2021</a:t>
+              <a:t>12/16/2021</a:t>
             </a:fld>
             <a:endParaRPr lang="en-US" dirty="0"/>
           </a:p>
@@ -7763,7 +7763,7 @@
           <a:p>
             <a:fld id="{7A24AD68-089C-4467-A8F3-EA2BBCA6B44E}" type="datetimeFigureOut">
               <a:rPr lang="en-US" dirty="0"/>
-              <a:t>12/15/2021</a:t>
+              <a:t>12/16/2021</a:t>
             </a:fld>
             <a:endParaRPr lang="en-US" dirty="0"/>
           </a:p>
@@ -7965,7 +7965,7 @@
           <a:p>
             <a:fld id="{75C51FCE-E4BB-4680-8E50-3C0E348D2609}" type="datetimeFigureOut">
               <a:rPr lang="en-US" dirty="0"/>
-              <a:t>12/15/2021</a:t>
+              <a:t>12/16/2021</a:t>
             </a:fld>
             <a:endParaRPr lang="en-US" dirty="0"/>
           </a:p>
@@ -9023,7 +9023,7 @@
           <a:p>
             <a:fld id="{8AAA073D-A903-47F8-8D16-77642FB0DF1F}" type="datetimeFigureOut">
               <a:rPr lang="en-US" dirty="0"/>
-              <a:t>12/15/2021</a:t>
+              <a:t>12/16/2021</a:t>
             </a:fld>
             <a:endParaRPr lang="en-US" dirty="0"/>
           </a:p>
@@ -9291,7 +9291,7 @@
           <a:p>
             <a:fld id="{AB91FA40-626B-4CA1-85D0-7A9016E395BA}" type="datetimeFigureOut">
               <a:rPr lang="en-US" dirty="0"/>
-              <a:t>12/15/2021</a:t>
+              <a:t>12/16/2021</a:t>
             </a:fld>
             <a:endParaRPr lang="en-US" dirty="0"/>
           </a:p>
@@ -9669,7 +9669,7 @@
           <a:p>
             <a:fld id="{C3F425EA-B9DC-48A7-991E-9A82573B1B21}" type="datetimeFigureOut">
               <a:rPr lang="en-US" dirty="0"/>
-              <a:t>12/15/2021</a:t>
+              <a:t>12/16/2021</a:t>
             </a:fld>
             <a:endParaRPr lang="en-US" dirty="0"/>
           </a:p>
@@ -9783,7 +9783,7 @@
           <a:p>
             <a:fld id="{66CB97F8-6CEB-469B-AFCC-889F2A2B1D5A}" type="datetimeFigureOut">
               <a:rPr lang="en-US" dirty="0"/>
-              <a:t>12/15/2021</a:t>
+              <a:t>12/16/2021</a:t>
             </a:fld>
             <a:endParaRPr lang="en-US" dirty="0"/>
           </a:p>
@@ -9874,7 +9874,7 @@
           <a:p>
             <a:fld id="{8FA9179F-009E-4FA5-B091-7EBB82A185BD}" type="datetimeFigureOut">
               <a:rPr lang="en-US" dirty="0"/>
-              <a:t>12/15/2021</a:t>
+              <a:t>12/16/2021</a:t>
             </a:fld>
             <a:endParaRPr lang="en-US" dirty="0"/>
           </a:p>
@@ -10979,7 +10979,7 @@
           <a:p>
             <a:fld id="{8E665CEB-0076-4E37-B880-BCEA9784DE0A}" type="datetimeFigureOut">
               <a:rPr lang="en-US" dirty="0"/>
-              <a:t>12/15/2021</a:t>
+              <a:t>12/16/2021</a:t>
             </a:fld>
             <a:endParaRPr lang="en-US" dirty="0"/>
           </a:p>
@@ -12108,7 +12108,7 @@
           <a:p>
             <a:fld id="{A6149E5E-3896-4118-99A7-7B85668F1C5E}" type="datetimeFigureOut">
               <a:rPr lang="en-US" dirty="0"/>
-              <a:t>12/15/2021</a:t>
+              <a:t>12/16/2021</a:t>
             </a:fld>
             <a:endParaRPr lang="en-US" dirty="0"/>
           </a:p>
@@ -13132,7 +13132,7 @@
           <a:p>
             <a:fld id="{7E0D914D-B099-4142-A885-11F276715148}" type="datetimeFigureOut">
               <a:rPr lang="en-US" dirty="0"/>
-              <a:t>12/15/2021</a:t>
+              <a:t>12/16/2021</a:t>
             </a:fld>
             <a:endParaRPr lang="en-US" dirty="0"/>
           </a:p>
@@ -15908,15 +15908,7 @@
           <a:p>
             <a:r>
               <a:rPr lang="en-IE" dirty="0"/>
-              <a:t>https using </a:t>
-            </a:r>
-            <a:r>
-              <a:rPr lang="en-IE" dirty="0" err="1"/>
-              <a:t>cloudflare</a:t>
-            </a:r>
-            <a:r>
-              <a:rPr lang="en-IE" dirty="0"/>
-              <a:t>.</a:t>
+              <a:t>https using Cloudflare.</a:t>
             </a:r>
           </a:p>
           <a:p>
@@ -15942,34 +15934,22 @@
           <a:p>
             <a:r>
               <a:rPr lang="en-IE" dirty="0"/>
-              <a:t>Mysql root password so only people with this password, can log into and use Mysql on the instance. </a:t>
+              <a:t>Mysql root password so only people with this password, can log into and use Mysql on the instance.</a:t>
             </a:r>
           </a:p>
           <a:p>
-            <a:r>
-              <a:rPr lang="en-IE" dirty="0"/>
-              <a:t>ETC </a:t>
-            </a:r>
-            <a:r>
-              <a:rPr lang="en-IE" dirty="0" err="1"/>
-              <a:t>ETC</a:t>
-            </a:r>
+            <a:pPr marL="0" indent="0">
+              <a:buNone/>
+            </a:pPr>
             <a:r>
               <a:rPr lang="en-IE" dirty="0"/>
               <a:t> </a:t>
             </a:r>
-            <a:r>
-              <a:rPr lang="en-IE" dirty="0" err="1"/>
-              <a:t>ETC</a:t>
-            </a:r>
-            <a:r>
-              <a:rPr lang="en-IE" dirty="0"/>
-              <a:t> </a:t>
-            </a:r>
-            <a:r>
-              <a:rPr lang="en-IE" dirty="0" err="1"/>
-              <a:t>ETC</a:t>
-            </a:r>
+          </a:p>
+          <a:p>
+            <a:pPr marL="0" indent="0">
+              <a:buNone/>
+            </a:pPr>
             <a:endParaRPr lang="en-IE" dirty="0"/>
           </a:p>
         </p:txBody>
@@ -16229,12 +16209,8 @@
           </a:p>
           <a:p>
             <a:r>
-              <a:rPr lang="en-IE" b="1" dirty="0" err="1"/>
-              <a:t>Maraital</a:t>
-            </a:r>
-            <a:r>
               <a:rPr lang="en-IE" b="1" dirty="0"/>
-              <a:t> Status: </a:t>
+              <a:t>Marital Status: </a:t>
             </a:r>
             <a:r>
               <a:rPr lang="en-IE" dirty="0"/>

</xml_diff>